<commit_message>
SEMPRO abis benerin ppt
</commit_message>
<xml_diff>
--- a/ppt/PPT SEMPRO FADHIL.pptx
+++ b/ppt/PPT SEMPRO FADHIL.pptx
@@ -5,10 +5,10 @@
     <p:sldMasterId id="2147483648" r:id="rId4"/>
   </p:sldMasterIdLst>
   <p:notesMasterIdLst>
-    <p:notesMasterId r:id="rId21"/>
+    <p:notesMasterId r:id="rId22"/>
   </p:notesMasterIdLst>
   <p:handoutMasterIdLst>
-    <p:handoutMasterId r:id="rId22"/>
+    <p:handoutMasterId r:id="rId23"/>
   </p:handoutMasterIdLst>
   <p:sldIdLst>
     <p:sldId id="256" r:id="rId5"/>
@@ -21,12 +21,13 @@
     <p:sldId id="259" r:id="rId12"/>
     <p:sldId id="271" r:id="rId13"/>
     <p:sldId id="264" r:id="rId14"/>
-    <p:sldId id="266" r:id="rId15"/>
-    <p:sldId id="273" r:id="rId16"/>
-    <p:sldId id="267" r:id="rId17"/>
-    <p:sldId id="270" r:id="rId18"/>
-    <p:sldId id="276" r:id="rId19"/>
-    <p:sldId id="275" r:id="rId20"/>
+    <p:sldId id="277" r:id="rId15"/>
+    <p:sldId id="266" r:id="rId16"/>
+    <p:sldId id="273" r:id="rId17"/>
+    <p:sldId id="267" r:id="rId18"/>
+    <p:sldId id="270" r:id="rId19"/>
+    <p:sldId id="276" r:id="rId20"/>
+    <p:sldId id="275" r:id="rId21"/>
   </p:sldIdLst>
   <p:sldSz cx="12192000" cy="6858000"/>
   <p:notesSz cx="6858000" cy="9144000"/>
@@ -244,7 +245,7 @@
             <a:pPr rtl="0"/>
             <a:fld id="{AB1BF87F-531B-4BDC-A663-C6A67C7BEC47}" type="datetime1">
               <a:rPr lang="id-ID" smtClean="0"/>
-              <a:t>18/07/2025</a:t>
+              <a:t>28/07/2025</a:t>
             </a:fld>
             <a:endParaRPr lang="id-ID" dirty="0"/>
           </a:p>
@@ -425,7 +426,7 @@
             <a:fld id="{7B08E6FE-7462-41B9-93AA-C863C0ADF1B6}" type="datetime1">
               <a:rPr lang="id-ID" smtClean="0"/>
               <a:pPr/>
-              <a:t>18/07/2025</a:t>
+              <a:t>28/07/2025</a:t>
             </a:fld>
             <a:endParaRPr lang="id-ID" dirty="0"/>
           </a:p>
@@ -966,7 +967,13 @@
   <p:cSld>
     <p:spTree>
       <p:nvGrpSpPr>
-        <p:cNvPr id="1" name=""/>
+        <p:cNvPr id="1" name="">
+          <a:extLst>
+            <a:ext uri="{FF2B5EF4-FFF2-40B4-BE49-F238E27FC236}">
+              <a16:creationId xmlns:a16="http://schemas.microsoft.com/office/drawing/2014/main" id="{750CE7C0-8485-8FB6-E5B2-19CC6B45686B}"/>
+            </a:ext>
+          </a:extLst>
+        </p:cNvPr>
         <p:cNvGrpSpPr/>
         <p:nvPr/>
       </p:nvGrpSpPr>
@@ -980,7 +987,13 @@
       </p:grpSpPr>
       <p:sp>
         <p:nvSpPr>
-          <p:cNvPr id="2" name="Tampungan Gambar Slide 1"/>
+          <p:cNvPr id="2" name="Tampungan Gambar Slide 1">
+            <a:extLst>
+              <a:ext uri="{FF2B5EF4-FFF2-40B4-BE49-F238E27FC236}">
+                <a16:creationId xmlns:a16="http://schemas.microsoft.com/office/drawing/2014/main" id="{E19CFBF1-15A7-5650-F008-D8C9767CB23A}"/>
+              </a:ext>
+            </a:extLst>
+          </p:cNvPr>
           <p:cNvSpPr>
             <a:spLocks noGrp="1" noRot="1" noChangeAspect="1"/>
           </p:cNvSpPr>
@@ -992,7 +1005,13 @@
       </p:sp>
       <p:sp>
         <p:nvSpPr>
-          <p:cNvPr id="3" name="Tampungan Catatan 2"/>
+          <p:cNvPr id="3" name="Tampungan Catatan 2">
+            <a:extLst>
+              <a:ext uri="{FF2B5EF4-FFF2-40B4-BE49-F238E27FC236}">
+                <a16:creationId xmlns:a16="http://schemas.microsoft.com/office/drawing/2014/main" id="{31A8D515-7FEB-4CB3-92A8-ABE517A49D2E}"/>
+              </a:ext>
+            </a:extLst>
+          </p:cNvPr>
           <p:cNvSpPr>
             <a:spLocks noGrp="1"/>
           </p:cNvSpPr>
@@ -1011,7 +1030,13 @@
       </p:sp>
       <p:sp>
         <p:nvSpPr>
-          <p:cNvPr id="4" name="Tampungan Nomor Slide 3"/>
+          <p:cNvPr id="4" name="Tampungan Nomor Slide 3">
+            <a:extLst>
+              <a:ext uri="{FF2B5EF4-FFF2-40B4-BE49-F238E27FC236}">
+                <a16:creationId xmlns:a16="http://schemas.microsoft.com/office/drawing/2014/main" id="{42551A57-F930-238C-7531-04329F3790D1}"/>
+              </a:ext>
+            </a:extLst>
+          </p:cNvPr>
           <p:cNvSpPr>
             <a:spLocks noGrp="1"/>
           </p:cNvSpPr>
@@ -1036,7 +1061,7 @@
     </p:spTree>
     <p:extLst>
       <p:ext uri="{BB962C8B-B14F-4D97-AF65-F5344CB8AC3E}">
-        <p14:creationId xmlns:p14="http://schemas.microsoft.com/office/powerpoint/2010/main" val="1470767662"/>
+        <p14:creationId xmlns:p14="http://schemas.microsoft.com/office/powerpoint/2010/main" val="3192030204"/>
       </p:ext>
     </p:extLst>
   </p:cSld>
@@ -1121,7 +1146,7 @@
     </p:spTree>
     <p:extLst>
       <p:ext uri="{BB962C8B-B14F-4D97-AF65-F5344CB8AC3E}">
-        <p14:creationId xmlns:p14="http://schemas.microsoft.com/office/powerpoint/2010/main" val="3293267610"/>
+        <p14:creationId xmlns:p14="http://schemas.microsoft.com/office/powerpoint/2010/main" val="1470767662"/>
       </p:ext>
     </p:extLst>
   </p:cSld>
@@ -1206,7 +1231,7 @@
     </p:spTree>
     <p:extLst>
       <p:ext uri="{BB962C8B-B14F-4D97-AF65-F5344CB8AC3E}">
-        <p14:creationId xmlns:p14="http://schemas.microsoft.com/office/powerpoint/2010/main" val="703596108"/>
+        <p14:creationId xmlns:p14="http://schemas.microsoft.com/office/powerpoint/2010/main" val="3293267610"/>
       </p:ext>
     </p:extLst>
   </p:cSld>
@@ -1291,6 +1316,91 @@
     </p:spTree>
     <p:extLst>
       <p:ext uri="{BB962C8B-B14F-4D97-AF65-F5344CB8AC3E}">
+        <p14:creationId xmlns:p14="http://schemas.microsoft.com/office/powerpoint/2010/main" val="703596108"/>
+      </p:ext>
+    </p:extLst>
+  </p:cSld>
+  <p:clrMapOvr>
+    <a:masterClrMapping/>
+  </p:clrMapOvr>
+</p:notes>
+</file>
+
+<file path=ppt/notesSlides/notesSlide15.xml><?xml version="1.0" encoding="utf-8"?>
+<p:notes xmlns:a="http://schemas.openxmlformats.org/drawingml/2006/main" xmlns:r="http://schemas.openxmlformats.org/officeDocument/2006/relationships" xmlns:p="http://schemas.openxmlformats.org/presentationml/2006/main">
+  <p:cSld>
+    <p:spTree>
+      <p:nvGrpSpPr>
+        <p:cNvPr id="1" name=""/>
+        <p:cNvGrpSpPr/>
+        <p:nvPr/>
+      </p:nvGrpSpPr>
+      <p:grpSpPr>
+        <a:xfrm>
+          <a:off x="0" y="0"/>
+          <a:ext cx="0" cy="0"/>
+          <a:chOff x="0" y="0"/>
+          <a:chExt cx="0" cy="0"/>
+        </a:xfrm>
+      </p:grpSpPr>
+      <p:sp>
+        <p:nvSpPr>
+          <p:cNvPr id="2" name="Tampungan Gambar Slide 1"/>
+          <p:cNvSpPr>
+            <a:spLocks noGrp="1" noRot="1" noChangeAspect="1"/>
+          </p:cNvSpPr>
+          <p:nvPr>
+            <p:ph type="sldImg"/>
+          </p:nvPr>
+        </p:nvSpPr>
+        <p:spPr/>
+      </p:sp>
+      <p:sp>
+        <p:nvSpPr>
+          <p:cNvPr id="3" name="Tampungan Catatan 2"/>
+          <p:cNvSpPr>
+            <a:spLocks noGrp="1"/>
+          </p:cNvSpPr>
+          <p:nvPr>
+            <p:ph type="body" idx="1"/>
+          </p:nvPr>
+        </p:nvSpPr>
+        <p:spPr/>
+        <p:txBody>
+          <a:bodyPr/>
+          <a:lstStyle/>
+          <a:p>
+            <a:endParaRPr lang="id-ID" noProof="0" dirty="0"/>
+          </a:p>
+        </p:txBody>
+      </p:sp>
+      <p:sp>
+        <p:nvSpPr>
+          <p:cNvPr id="4" name="Tampungan Nomor Slide 3"/>
+          <p:cNvSpPr>
+            <a:spLocks noGrp="1"/>
+          </p:cNvSpPr>
+          <p:nvPr>
+            <p:ph type="sldNum" sz="quarter" idx="5"/>
+          </p:nvPr>
+        </p:nvSpPr>
+        <p:spPr/>
+        <p:txBody>
+          <a:bodyPr/>
+          <a:lstStyle/>
+          <a:p>
+            <a:pPr rtl="0"/>
+            <a:fld id="{F97DC217-DF71-1A49-B3EA-559F1F43B0FF}" type="slidenum">
+              <a:rPr lang="id-ID" smtClean="0"/>
+              <a:t>15</a:t>
+            </a:fld>
+            <a:endParaRPr lang="id-ID"/>
+          </a:p>
+        </p:txBody>
+      </p:sp>
+    </p:spTree>
+    <p:extLst>
+      <p:ext uri="{BB962C8B-B14F-4D97-AF65-F5344CB8AC3E}">
         <p14:creationId xmlns:p14="http://schemas.microsoft.com/office/powerpoint/2010/main" val="489342786"/>
       </p:ext>
     </p:extLst>
@@ -1301,7 +1411,7 @@
 </p:notes>
 </file>
 
-<file path=ppt/notesSlides/notesSlide15.xml><?xml version="1.0" encoding="utf-8"?>
+<file path=ppt/notesSlides/notesSlide16.xml><?xml version="1.0" encoding="utf-8"?>
 <p:notes xmlns:a="http://schemas.openxmlformats.org/drawingml/2006/main" xmlns:r="http://schemas.openxmlformats.org/officeDocument/2006/relationships" xmlns:p="http://schemas.openxmlformats.org/presentationml/2006/main">
   <p:cSld>
     <p:spTree>
@@ -1391,7 +1501,7 @@
             <a:pPr rtl="0"/>
             <a:fld id="{F97DC217-DF71-1A49-B3EA-559F1F43B0FF}" type="slidenum">
               <a:rPr lang="id-ID" smtClean="0"/>
-              <a:t>15</a:t>
+              <a:t>16</a:t>
             </a:fld>
             <a:endParaRPr lang="id-ID"/>
           </a:p>
@@ -1410,7 +1520,7 @@
 </p:notes>
 </file>
 
-<file path=ppt/notesSlides/notesSlide16.xml><?xml version="1.0" encoding="utf-8"?>
+<file path=ppt/notesSlides/notesSlide17.xml><?xml version="1.0" encoding="utf-8"?>
 <p:notes xmlns:a="http://schemas.openxmlformats.org/drawingml/2006/main" xmlns:r="http://schemas.openxmlformats.org/officeDocument/2006/relationships" xmlns:p="http://schemas.openxmlformats.org/presentationml/2006/main">
   <p:cSld>
     <p:spTree>
@@ -1476,7 +1586,7 @@
             <a:pPr rtl="0"/>
             <a:fld id="{F97DC217-DF71-1A49-B3EA-559F1F43B0FF}" type="slidenum">
               <a:rPr lang="id-ID" smtClean="0"/>
-              <a:t>16</a:t>
+              <a:t>17</a:t>
             </a:fld>
             <a:endParaRPr lang="id-ID"/>
           </a:p>
@@ -3567,7 +3677,7 @@
             <a:pPr rtl="0"/>
             <a:fld id="{5FB06667-F309-4D31-9192-FA935AFD6E2C}" type="datetime1">
               <a:rPr lang="id-ID" noProof="0" smtClean="0"/>
-              <a:t>18/07/2025</a:t>
+              <a:t>28/07/2025</a:t>
             </a:fld>
             <a:endParaRPr lang="id-ID" noProof="0"/>
           </a:p>
@@ -4454,7 +4564,7 @@
             <a:pPr rtl="0"/>
             <a:fld id="{864F080E-00EF-45FB-879B-543FC5219789}" type="datetime1">
               <a:rPr lang="id-ID" noProof="0" smtClean="0"/>
-              <a:t>18/07/2025</a:t>
+              <a:t>28/07/2025</a:t>
             </a:fld>
             <a:endParaRPr lang="id-ID" noProof="0"/>
           </a:p>
@@ -5630,7 +5740,7 @@
             <a:pPr rtl="0"/>
             <a:fld id="{FED39403-5B82-4458-B314-3455B2B980C6}" type="datetime1">
               <a:rPr lang="id-ID" noProof="0" smtClean="0"/>
-              <a:t>18/07/2025</a:t>
+              <a:t>28/07/2025</a:t>
             </a:fld>
             <a:endParaRPr lang="id-ID" noProof="0"/>
           </a:p>
@@ -7709,7 +7819,7 @@
             <a:pPr rtl="0"/>
             <a:fld id="{51A9B3F0-40B4-402B-BD3D-2ECBD63B1A7A}" type="datetime1">
               <a:rPr lang="id-ID" noProof="0" smtClean="0"/>
-              <a:t>18/07/2025</a:t>
+              <a:t>28/07/2025</a:t>
             </a:fld>
             <a:endParaRPr lang="id-ID" noProof="0"/>
           </a:p>
@@ -8430,7 +8540,7 @@
             <a:pPr rtl="0"/>
             <a:fld id="{C66938A1-13E2-4EB3-A9CB-9E58C4A52052}" type="datetime1">
               <a:rPr lang="id-ID" noProof="0" smtClean="0"/>
-              <a:t>18/07/2025</a:t>
+              <a:t>28/07/2025</a:t>
             </a:fld>
             <a:endParaRPr lang="id-ID" noProof="0"/>
           </a:p>
@@ -9662,7 +9772,7 @@
             <a:pPr rtl="0"/>
             <a:fld id="{8E39C280-D1CE-4C14-BB73-A42EFC7AA47C}" type="datetime1">
               <a:rPr lang="id-ID" noProof="0" smtClean="0"/>
-              <a:t>18/07/2025</a:t>
+              <a:t>28/07/2025</a:t>
             </a:fld>
             <a:endParaRPr lang="id-ID" noProof="0"/>
           </a:p>
@@ -10256,7 +10366,7 @@
             <a:pPr rtl="0"/>
             <a:fld id="{7CF46B1F-6981-4F1A-BBFE-32021A818C89}" type="datetime1">
               <a:rPr lang="id-ID" noProof="0" smtClean="0"/>
-              <a:t>18/07/2025</a:t>
+              <a:t>28/07/2025</a:t>
             </a:fld>
             <a:endParaRPr lang="id-ID" noProof="0"/>
           </a:p>
@@ -10732,7 +10842,7 @@
             <a:pPr rtl="0"/>
             <a:fld id="{84E9CC79-66B9-422C-A06E-4D4DCD64D4AF}" type="datetime1">
               <a:rPr lang="id-ID" noProof="0" smtClean="0"/>
-              <a:t>18/07/2025</a:t>
+              <a:t>28/07/2025</a:t>
             </a:fld>
             <a:endParaRPr lang="id-ID" noProof="0"/>
           </a:p>
@@ -11589,7 +11699,7 @@
             <a:pPr rtl="0"/>
             <a:fld id="{7B48DF3E-AD03-4E2F-9529-7FF1401E86D2}" type="datetime1">
               <a:rPr lang="id-ID" noProof="0" smtClean="0"/>
-              <a:t>18/07/2025</a:t>
+              <a:t>28/07/2025</a:t>
             </a:fld>
             <a:endParaRPr lang="id-ID" noProof="0"/>
           </a:p>
@@ -13825,7 +13935,7 @@
             <a:pPr rtl="0"/>
             <a:fld id="{0313E8A0-0BEB-4298-AEE4-B7CCF6490583}" type="datetime1">
               <a:rPr lang="id-ID" noProof="0" smtClean="0"/>
-              <a:t>18/07/2025</a:t>
+              <a:t>28/07/2025</a:t>
             </a:fld>
             <a:endParaRPr lang="id-ID" noProof="0"/>
           </a:p>
@@ -14097,7 +14207,7 @@
             <a:pPr rtl="0"/>
             <a:fld id="{C829E6E2-2665-481C-9621-3949D48D67CF}" type="datetime1">
               <a:rPr lang="id-ID" noProof="0" smtClean="0"/>
-              <a:t>18/07/2025</a:t>
+              <a:t>28/07/2025</a:t>
             </a:fld>
             <a:endParaRPr lang="id-ID" noProof="0"/>
           </a:p>
@@ -14692,7 +14802,15 @@
             </a:r>
             <a:r>
               <a:rPr lang="id-ID" sz="2800" dirty="0"/>
-              <a:t> (XG) DALAM ANALISIS SEPAK BOLA</a:t>
+              <a:t> (</a:t>
+            </a:r>
+            <a:r>
+              <a:rPr lang="en-GB" sz="2800" dirty="0"/>
+              <a:t>x</a:t>
+            </a:r>
+            <a:r>
+              <a:rPr lang="id-ID" sz="2800" dirty="0"/>
+              <a:t>G) DALAM ANALISIS SEPAK BOLA</a:t>
             </a:r>
           </a:p>
         </p:txBody>
@@ -15565,6 +15683,412 @@
   <p:cSld>
     <p:spTree>
       <p:nvGrpSpPr>
+        <p:cNvPr id="1" name="">
+          <a:extLst>
+            <a:ext uri="{FF2B5EF4-FFF2-40B4-BE49-F238E27FC236}">
+              <a16:creationId xmlns:a16="http://schemas.microsoft.com/office/drawing/2014/main" id="{88BC9BD7-3D23-6F10-EF7E-7DC20D307928}"/>
+            </a:ext>
+          </a:extLst>
+        </p:cNvPr>
+        <p:cNvGrpSpPr/>
+        <p:nvPr/>
+      </p:nvGrpSpPr>
+      <p:grpSpPr>
+        <a:xfrm>
+          <a:off x="0" y="0"/>
+          <a:ext cx="0" cy="0"/>
+          <a:chOff x="0" y="0"/>
+          <a:chExt cx="0" cy="0"/>
+        </a:xfrm>
+      </p:grpSpPr>
+      <p:sp>
+        <p:nvSpPr>
+          <p:cNvPr id="2" name="Judul 1">
+            <a:extLst>
+              <a:ext uri="{FF2B5EF4-FFF2-40B4-BE49-F238E27FC236}">
+                <a16:creationId xmlns:a16="http://schemas.microsoft.com/office/drawing/2014/main" id="{621A8F7B-46EE-77F6-2550-6ABA371AFD50}"/>
+              </a:ext>
+            </a:extLst>
+          </p:cNvPr>
+          <p:cNvSpPr>
+            <a:spLocks noGrp="1"/>
+          </p:cNvSpPr>
+          <p:nvPr>
+            <p:ph type="title"/>
+          </p:nvPr>
+        </p:nvSpPr>
+        <p:spPr>
+          <a:xfrm>
+            <a:off x="750430" y="381000"/>
+            <a:ext cx="10678142" cy="1325563"/>
+          </a:xfrm>
+        </p:spPr>
+        <p:txBody>
+          <a:bodyPr rtlCol="0"/>
+          <a:lstStyle/>
+          <a:p>
+            <a:pPr rtl="0"/>
+            <a:r>
+              <a:rPr lang="en-GB" dirty="0" err="1"/>
+              <a:t>Landasan</a:t>
+            </a:r>
+            <a:r>
+              <a:rPr lang="en-GB" dirty="0"/>
+              <a:t> Teori</a:t>
+            </a:r>
+            <a:br>
+              <a:rPr lang="en-GB" dirty="0"/>
+            </a:br>
+            <a:r>
+              <a:rPr lang="en-GB" sz="4000" b="0" i="1" dirty="0"/>
+              <a:t>Knowledge Discovery in Databases (KDD)</a:t>
+            </a:r>
+            <a:endParaRPr lang="id-ID" dirty="0"/>
+          </a:p>
+        </p:txBody>
+      </p:sp>
+      <p:sp>
+        <p:nvSpPr>
+          <p:cNvPr id="5" name="Tampungan Nomor Slide 4">
+            <a:extLst>
+              <a:ext uri="{FF2B5EF4-FFF2-40B4-BE49-F238E27FC236}">
+                <a16:creationId xmlns:a16="http://schemas.microsoft.com/office/drawing/2014/main" id="{850C921C-D3AA-E132-ED29-DA456818059D}"/>
+              </a:ext>
+            </a:extLst>
+          </p:cNvPr>
+          <p:cNvSpPr>
+            <a:spLocks noGrp="1"/>
+          </p:cNvSpPr>
+          <p:nvPr>
+            <p:ph type="sldNum" sz="quarter" idx="27"/>
+          </p:nvPr>
+        </p:nvSpPr>
+        <p:spPr>
+          <a:xfrm>
+            <a:off x="9067800" y="6356350"/>
+            <a:ext cx="2743200" cy="365125"/>
+          </a:xfrm>
+        </p:spPr>
+        <p:txBody>
+          <a:bodyPr rtlCol="0"/>
+          <a:lstStyle/>
+          <a:p>
+            <a:pPr rtl="0"/>
+            <a:fld id="{294A09A9-5501-47C1-A89A-A340965A2BE2}" type="slidenum">
+              <a:rPr lang="id-ID" smtClean="0"/>
+              <a:pPr rtl="0"/>
+              <a:t>11</a:t>
+            </a:fld>
+            <a:endParaRPr lang="id-ID"/>
+          </a:p>
+        </p:txBody>
+      </p:sp>
+      <p:sp>
+        <p:nvSpPr>
+          <p:cNvPr id="78" name="Content Placeholder 7">
+            <a:extLst>
+              <a:ext uri="{FF2B5EF4-FFF2-40B4-BE49-F238E27FC236}">
+                <a16:creationId xmlns:a16="http://schemas.microsoft.com/office/drawing/2014/main" id="{BC596EEE-E7DA-888F-8DD6-E1A326759936}"/>
+              </a:ext>
+            </a:extLst>
+          </p:cNvPr>
+          <p:cNvSpPr txBox="1">
+            <a:spLocks/>
+          </p:cNvSpPr>
+          <p:nvPr/>
+        </p:nvSpPr>
+        <p:spPr>
+          <a:xfrm>
+            <a:off x="576258" y="1706563"/>
+            <a:ext cx="6114726" cy="2687637"/>
+          </a:xfrm>
+          <a:prstGeom prst="rect">
+            <a:avLst/>
+          </a:prstGeom>
+        </p:spPr>
+        <p:txBody>
+          <a:bodyPr/>
+          <a:lstStyle>
+            <a:lvl1pPr marL="228600" indent="-228600" algn="l" defTabSz="914400" rtl="0" eaLnBrk="1" latinLnBrk="0" hangingPunct="1">
+              <a:lnSpc>
+                <a:spcPct val="90000"/>
+              </a:lnSpc>
+              <a:spcBef>
+                <a:spcPts val="1000"/>
+              </a:spcBef>
+              <a:buFont typeface="Arial" panose="020B0604020202020204" pitchFamily="34" charset="0"/>
+              <a:buChar char="•"/>
+              <a:defRPr sz="2800" kern="1200">
+                <a:solidFill>
+                  <a:schemeClr val="tx1"/>
+                </a:solidFill>
+                <a:latin typeface="+mn-lt"/>
+                <a:ea typeface="+mn-ea"/>
+                <a:cs typeface="+mn-cs"/>
+              </a:defRPr>
+            </a:lvl1pPr>
+            <a:lvl2pPr marL="685800" indent="-228600" algn="l" defTabSz="914400" rtl="0" eaLnBrk="1" latinLnBrk="0" hangingPunct="1">
+              <a:lnSpc>
+                <a:spcPct val="90000"/>
+              </a:lnSpc>
+              <a:spcBef>
+                <a:spcPts val="500"/>
+              </a:spcBef>
+              <a:buFont typeface="Arial" panose="020B0604020202020204" pitchFamily="34" charset="0"/>
+              <a:buChar char="•"/>
+              <a:defRPr sz="2400" kern="1200">
+                <a:solidFill>
+                  <a:schemeClr val="tx1"/>
+                </a:solidFill>
+                <a:latin typeface="+mn-lt"/>
+                <a:ea typeface="+mn-ea"/>
+                <a:cs typeface="+mn-cs"/>
+              </a:defRPr>
+            </a:lvl2pPr>
+            <a:lvl3pPr marL="1143000" indent="-228600" algn="l" defTabSz="914400" rtl="0" eaLnBrk="1" latinLnBrk="0" hangingPunct="1">
+              <a:lnSpc>
+                <a:spcPct val="90000"/>
+              </a:lnSpc>
+              <a:spcBef>
+                <a:spcPts val="500"/>
+              </a:spcBef>
+              <a:buFont typeface="Arial" panose="020B0604020202020204" pitchFamily="34" charset="0"/>
+              <a:buChar char="•"/>
+              <a:defRPr sz="2000" kern="1200">
+                <a:solidFill>
+                  <a:schemeClr val="tx1"/>
+                </a:solidFill>
+                <a:latin typeface="+mn-lt"/>
+                <a:ea typeface="+mn-ea"/>
+                <a:cs typeface="+mn-cs"/>
+              </a:defRPr>
+            </a:lvl3pPr>
+            <a:lvl4pPr marL="1600200" indent="-228600" algn="l" defTabSz="914400" rtl="0" eaLnBrk="1" latinLnBrk="0" hangingPunct="1">
+              <a:lnSpc>
+                <a:spcPct val="90000"/>
+              </a:lnSpc>
+              <a:spcBef>
+                <a:spcPts val="500"/>
+              </a:spcBef>
+              <a:buFont typeface="Arial" panose="020B0604020202020204" pitchFamily="34" charset="0"/>
+              <a:buChar char="•"/>
+              <a:defRPr sz="1800" kern="1200">
+                <a:solidFill>
+                  <a:schemeClr val="tx1"/>
+                </a:solidFill>
+                <a:latin typeface="+mn-lt"/>
+                <a:ea typeface="+mn-ea"/>
+                <a:cs typeface="+mn-cs"/>
+              </a:defRPr>
+            </a:lvl4pPr>
+            <a:lvl5pPr marL="2057400" indent="-228600" algn="l" defTabSz="914400" rtl="0" eaLnBrk="1" latinLnBrk="0" hangingPunct="1">
+              <a:lnSpc>
+                <a:spcPct val="90000"/>
+              </a:lnSpc>
+              <a:spcBef>
+                <a:spcPts val="500"/>
+              </a:spcBef>
+              <a:buFont typeface="Arial" panose="020B0604020202020204" pitchFamily="34" charset="0"/>
+              <a:buChar char="•"/>
+              <a:defRPr sz="1800" kern="1200">
+                <a:solidFill>
+                  <a:schemeClr val="tx1"/>
+                </a:solidFill>
+                <a:latin typeface="+mn-lt"/>
+                <a:ea typeface="+mn-ea"/>
+                <a:cs typeface="+mn-cs"/>
+              </a:defRPr>
+            </a:lvl5pPr>
+            <a:lvl6pPr marL="2514600" indent="-228600" algn="l" defTabSz="914400" rtl="0" eaLnBrk="1" latinLnBrk="0" hangingPunct="1">
+              <a:lnSpc>
+                <a:spcPct val="90000"/>
+              </a:lnSpc>
+              <a:spcBef>
+                <a:spcPts val="500"/>
+              </a:spcBef>
+              <a:buFont typeface="Arial" panose="020B0604020202020204" pitchFamily="34" charset="0"/>
+              <a:buChar char="•"/>
+              <a:defRPr sz="1800" kern="1200">
+                <a:solidFill>
+                  <a:schemeClr val="tx1"/>
+                </a:solidFill>
+                <a:latin typeface="+mn-lt"/>
+                <a:ea typeface="+mn-ea"/>
+                <a:cs typeface="+mn-cs"/>
+              </a:defRPr>
+            </a:lvl6pPr>
+            <a:lvl7pPr marL="2971800" indent="-228600" algn="l" defTabSz="914400" rtl="0" eaLnBrk="1" latinLnBrk="0" hangingPunct="1">
+              <a:lnSpc>
+                <a:spcPct val="90000"/>
+              </a:lnSpc>
+              <a:spcBef>
+                <a:spcPts val="500"/>
+              </a:spcBef>
+              <a:buFont typeface="Arial" panose="020B0604020202020204" pitchFamily="34" charset="0"/>
+              <a:buChar char="•"/>
+              <a:defRPr sz="1800" kern="1200">
+                <a:solidFill>
+                  <a:schemeClr val="tx1"/>
+                </a:solidFill>
+                <a:latin typeface="+mn-lt"/>
+                <a:ea typeface="+mn-ea"/>
+                <a:cs typeface="+mn-cs"/>
+              </a:defRPr>
+            </a:lvl7pPr>
+            <a:lvl8pPr marL="3429000" indent="-228600" algn="l" defTabSz="914400" rtl="0" eaLnBrk="1" latinLnBrk="0" hangingPunct="1">
+              <a:lnSpc>
+                <a:spcPct val="90000"/>
+              </a:lnSpc>
+              <a:spcBef>
+                <a:spcPts val="500"/>
+              </a:spcBef>
+              <a:buFont typeface="Arial" panose="020B0604020202020204" pitchFamily="34" charset="0"/>
+              <a:buChar char="•"/>
+              <a:defRPr sz="1800" kern="1200">
+                <a:solidFill>
+                  <a:schemeClr val="tx1"/>
+                </a:solidFill>
+                <a:latin typeface="+mn-lt"/>
+                <a:ea typeface="+mn-ea"/>
+                <a:cs typeface="+mn-cs"/>
+              </a:defRPr>
+            </a:lvl8pPr>
+            <a:lvl9pPr marL="3886200" indent="-228600" algn="l" defTabSz="914400" rtl="0" eaLnBrk="1" latinLnBrk="0" hangingPunct="1">
+              <a:lnSpc>
+                <a:spcPct val="90000"/>
+              </a:lnSpc>
+              <a:spcBef>
+                <a:spcPts val="500"/>
+              </a:spcBef>
+              <a:buFont typeface="Arial" panose="020B0604020202020204" pitchFamily="34" charset="0"/>
+              <a:buChar char="•"/>
+              <a:defRPr sz="1800" kern="1200">
+                <a:solidFill>
+                  <a:schemeClr val="tx1"/>
+                </a:solidFill>
+                <a:latin typeface="+mn-lt"/>
+                <a:ea typeface="+mn-ea"/>
+                <a:cs typeface="+mn-cs"/>
+              </a:defRPr>
+            </a:lvl9pPr>
+          </a:lstStyle>
+          <a:p>
+            <a:pPr marL="457200" indent="-457200"/>
+            <a:r>
+              <a:rPr lang="id-ID" sz="2400" b="1" dirty="0"/>
+              <a:t>KDD</a:t>
+            </a:r>
+            <a:r>
+              <a:rPr lang="id-ID" sz="2400" dirty="0"/>
+              <a:t> adalah kerangka kerja sistematis yang menjadi </a:t>
+            </a:r>
+            <a:r>
+              <a:rPr lang="id-ID" sz="2400" b="1" dirty="0"/>
+              <a:t>fondasi metodologi</a:t>
+            </a:r>
+            <a:r>
+              <a:rPr lang="id-ID" sz="2400" dirty="0"/>
+              <a:t> dalam penelitian ini, yang bertujuan untuk mengekstraksi pengetahuan berharga dari data mentah.</a:t>
+            </a:r>
+            <a:endParaRPr lang="en-GB" sz="2400" dirty="0"/>
+          </a:p>
+          <a:p>
+            <a:pPr marL="457200" indent="-457200"/>
+            <a:r>
+              <a:rPr lang="fi-FI" sz="2400" dirty="0"/>
+              <a:t>Penelitian ini mengikuti lima tahapan utama dari proses KDD:</a:t>
+            </a:r>
+          </a:p>
+          <a:p>
+            <a:pPr marL="914400" lvl="1" indent="-457200"/>
+            <a:r>
+              <a:rPr lang="id-ID" sz="2000" dirty="0" err="1"/>
+              <a:t>Selection</a:t>
+            </a:r>
+            <a:endParaRPr lang="en-GB" sz="2000" dirty="0"/>
+          </a:p>
+          <a:p>
+            <a:pPr marL="914400" lvl="1" indent="-457200"/>
+            <a:r>
+              <a:rPr lang="id-ID" sz="2000" dirty="0" err="1"/>
+              <a:t>Preprocessing</a:t>
+            </a:r>
+            <a:endParaRPr lang="en-GB" sz="2000" dirty="0"/>
+          </a:p>
+          <a:p>
+            <a:pPr marL="914400" lvl="1" indent="-457200"/>
+            <a:r>
+              <a:rPr lang="id-ID" sz="2000" dirty="0" err="1"/>
+              <a:t>Transformation</a:t>
+            </a:r>
+            <a:endParaRPr lang="en-GB" sz="2000" dirty="0"/>
+          </a:p>
+          <a:p>
+            <a:pPr marL="914400" lvl="1" indent="-457200"/>
+            <a:r>
+              <a:rPr lang="id-ID" sz="2000" dirty="0"/>
+              <a:t>Data Mining</a:t>
+            </a:r>
+            <a:endParaRPr lang="en-GB" sz="2000" dirty="0"/>
+          </a:p>
+          <a:p>
+            <a:pPr marL="914400" lvl="1" indent="-457200"/>
+            <a:r>
+              <a:rPr lang="id-ID" sz="2000" dirty="0" err="1"/>
+              <a:t>Evaluation</a:t>
+            </a:r>
+            <a:endParaRPr lang="id-ID" sz="2000" dirty="0"/>
+          </a:p>
+        </p:txBody>
+      </p:sp>
+      <p:pic>
+        <p:nvPicPr>
+          <p:cNvPr id="6" name="Picture 5">
+            <a:extLst>
+              <a:ext uri="{FF2B5EF4-FFF2-40B4-BE49-F238E27FC236}">
+                <a16:creationId xmlns:a16="http://schemas.microsoft.com/office/drawing/2014/main" id="{72A4BF18-0867-E679-D6E7-4573FA5056EB}"/>
+              </a:ext>
+            </a:extLst>
+          </p:cNvPr>
+          <p:cNvPicPr>
+            <a:picLocks noChangeAspect="1"/>
+          </p:cNvPicPr>
+          <p:nvPr/>
+        </p:nvPicPr>
+        <p:blipFill>
+          <a:blip r:embed="rId3"/>
+          <a:stretch>
+            <a:fillRect/>
+          </a:stretch>
+        </p:blipFill>
+        <p:spPr>
+          <a:xfrm>
+            <a:off x="6865156" y="2188261"/>
+            <a:ext cx="5326845" cy="2840939"/>
+          </a:xfrm>
+          <a:prstGeom prst="rect">
+            <a:avLst/>
+          </a:prstGeom>
+        </p:spPr>
+      </p:pic>
+    </p:spTree>
+    <p:extLst>
+      <p:ext uri="{BB962C8B-B14F-4D97-AF65-F5344CB8AC3E}">
+        <p14:creationId xmlns:p14="http://schemas.microsoft.com/office/powerpoint/2010/main" val="2763463501"/>
+      </p:ext>
+    </p:extLst>
+  </p:cSld>
+  <p:clrMapOvr>
+    <a:masterClrMapping/>
+  </p:clrMapOvr>
+</p:sld>
+</file>
+
+<file path=ppt/slides/slide12.xml><?xml version="1.0" encoding="utf-8"?>
+<p:sld xmlns:a="http://schemas.openxmlformats.org/drawingml/2006/main" xmlns:r="http://schemas.openxmlformats.org/officeDocument/2006/relationships" xmlns:p="http://schemas.openxmlformats.org/presentationml/2006/main">
+  <p:cSld>
+    <p:spTree>
+      <p:nvGrpSpPr>
         <p:cNvPr id="1" name=""/>
         <p:cNvGrpSpPr/>
         <p:nvPr/>
@@ -15650,7 +16174,7 @@
             <a:fld id="{294A09A9-5501-47C1-A89A-A340965A2BE2}" type="slidenum">
               <a:rPr lang="id-ID" smtClean="0"/>
               <a:pPr rtl="0"/>
-              <a:t>11</a:t>
+              <a:t>12</a:t>
             </a:fld>
             <a:endParaRPr lang="id-ID"/>
           </a:p>
@@ -15671,14 +16195,14 @@
           <p:nvPr>
             <p:extLst>
               <p:ext uri="{D42A27DB-BD31-4B8C-83A1-F6EECF244321}">
-                <p14:modId xmlns:p14="http://schemas.microsoft.com/office/powerpoint/2010/main" val="4030032255"/>
+                <p14:modId xmlns:p14="http://schemas.microsoft.com/office/powerpoint/2010/main" val="3701526356"/>
               </p:ext>
             </p:extLst>
           </p:nvPr>
         </p:nvGraphicFramePr>
         <p:xfrm>
           <a:off x="806450" y="1623772"/>
-          <a:ext cx="10375900" cy="3200400"/>
+          <a:ext cx="10375900" cy="3683399"/>
         </p:xfrm>
         <a:graphic>
           <a:graphicData uri="http://schemas.openxmlformats.org/drawingml/2006/table">
@@ -15687,21 +16211,28 @@
                 <a:tableStyleId>{5C22544A-7EE6-4342-B048-85BDC9FD1C3A}</a:tableStyleId>
               </a:tblPr>
               <a:tblGrid>
-                <a:gridCol w="863600">
+                <a:gridCol w="507781">
                   <a:extLst>
                     <a:ext uri="{9D8B030D-6E8A-4147-A177-3AD203B41FA5}">
                       <a16:colId xmlns:a16="http://schemas.microsoft.com/office/drawing/2014/main" val="1318640318"/>
                     </a:ext>
                   </a:extLst>
                 </a:gridCol>
-                <a:gridCol w="2241550">
+                <a:gridCol w="2092646">
                   <a:extLst>
                     <a:ext uri="{9D8B030D-6E8A-4147-A177-3AD203B41FA5}">
                       <a16:colId xmlns:a16="http://schemas.microsoft.com/office/drawing/2014/main" val="3015719754"/>
                     </a:ext>
                   </a:extLst>
                 </a:gridCol>
-                <a:gridCol w="7270750">
+                <a:gridCol w="3259394">
+                  <a:extLst>
+                    <a:ext uri="{9D8B030D-6E8A-4147-A177-3AD203B41FA5}">
+                      <a16:colId xmlns:a16="http://schemas.microsoft.com/office/drawing/2014/main" val="2964952324"/>
+                    </a:ext>
+                  </a:extLst>
+                </a:gridCol>
+                <a:gridCol w="4516079">
                   <a:extLst>
                     <a:ext uri="{9D8B030D-6E8A-4147-A177-3AD203B41FA5}">
                       <a16:colId xmlns:a16="http://schemas.microsoft.com/office/drawing/2014/main" val="3054673178"/>
@@ -15768,6 +16299,42 @@
                           <a:cs typeface="Arial" panose="020B0604020202020204" pitchFamily="34" charset="0"/>
                         </a:rPr>
                         <a:t>Penulis</a:t>
+                      </a:r>
+                      <a:endParaRPr lang="id-ID" sz="1800" kern="100" dirty="0">
+                        <a:solidFill>
+                          <a:schemeClr val="bg1"/>
+                        </a:solidFill>
+                        <a:effectLst/>
+                        <a:latin typeface="Tenorite" panose="00000500000000000000" pitchFamily="2" charset="0"/>
+                        <a:ea typeface="Calibri" panose="020F0502020204030204" pitchFamily="34" charset="0"/>
+                        <a:cs typeface="Arial" panose="020B0604020202020204" pitchFamily="34" charset="0"/>
+                      </a:endParaRPr>
+                    </a:p>
+                  </a:txBody>
+                  <a:tcPr marL="34301" marR="34301" marT="0" marB="0" anchor="ctr"/>
+                </a:tc>
+                <a:tc>
+                  <a:txBody>
+                    <a:bodyPr/>
+                    <a:lstStyle/>
+                    <a:p>
+                      <a:pPr algn="l">
+                        <a:lnSpc>
+                          <a:spcPct val="100000"/>
+                        </a:lnSpc>
+                        <a:buNone/>
+                      </a:pPr>
+                      <a:r>
+                        <a:rPr lang="en-GB" sz="1800" kern="100" dirty="0">
+                          <a:solidFill>
+                            <a:schemeClr val="bg1"/>
+                          </a:solidFill>
+                          <a:effectLst/>
+                          <a:latin typeface="Tenorite" panose="00000500000000000000" pitchFamily="2" charset="0"/>
+                          <a:ea typeface="Calibri" panose="020F0502020204030204" pitchFamily="34" charset="0"/>
+                          <a:cs typeface="Arial" panose="020B0604020202020204" pitchFamily="34" charset="0"/>
+                        </a:rPr>
+                        <a:t>Model</a:t>
                       </a:r>
                       <a:endParaRPr lang="id-ID" sz="1800" kern="100" dirty="0">
                         <a:solidFill>
@@ -15895,6 +16462,78 @@
                           <a:effectLst/>
                         </a:rPr>
                         <a:t> (2024)</a:t>
+                      </a:r>
+                      <a:endParaRPr lang="id-ID" sz="1800" kern="100" dirty="0">
+                        <a:solidFill>
+                          <a:srgbClr val="000000"/>
+                        </a:solidFill>
+                        <a:effectLst/>
+                        <a:latin typeface="Times New Roman" panose="02020603050405020304" pitchFamily="18" charset="0"/>
+                        <a:ea typeface="Calibri" panose="020F0502020204030204" pitchFamily="34" charset="0"/>
+                        <a:cs typeface="Arial" panose="020B0604020202020204" pitchFamily="34" charset="0"/>
+                      </a:endParaRPr>
+                    </a:p>
+                  </a:txBody>
+                  <a:tcPr marL="34301" marR="34301" marT="0" marB="0" anchor="ctr"/>
+                </a:tc>
+                <a:tc>
+                  <a:txBody>
+                    <a:bodyPr/>
+                    <a:lstStyle/>
+                    <a:p>
+                      <a:pPr algn="l">
+                        <a:lnSpc>
+                          <a:spcPct val="100000"/>
+                        </a:lnSpc>
+                        <a:buNone/>
+                      </a:pPr>
+                      <a:r>
+                        <a:rPr lang="id-ID" sz="1800" i="1" kern="1200" dirty="0" err="1">
+                          <a:solidFill>
+                            <a:schemeClr val="dk1"/>
+                          </a:solidFill>
+                          <a:effectLst/>
+                          <a:latin typeface="+mn-lt"/>
+                          <a:ea typeface="+mn-ea"/>
+                          <a:cs typeface="+mn-cs"/>
+                        </a:rPr>
+                        <a:t>Random</a:t>
+                      </a:r>
+                      <a:r>
+                        <a:rPr lang="id-ID" sz="1800" i="1" kern="1200" dirty="0">
+                          <a:solidFill>
+                            <a:schemeClr val="dk1"/>
+                          </a:solidFill>
+                          <a:effectLst/>
+                          <a:latin typeface="+mn-lt"/>
+                          <a:ea typeface="+mn-ea"/>
+                          <a:cs typeface="+mn-cs"/>
+                        </a:rPr>
+                        <a:t> </a:t>
+                      </a:r>
+                      <a:r>
+                        <a:rPr lang="id-ID" sz="1800" i="1" kern="1200" dirty="0" err="1">
+                          <a:solidFill>
+                            <a:schemeClr val="dk1"/>
+                          </a:solidFill>
+                          <a:effectLst/>
+                          <a:latin typeface="+mn-lt"/>
+                          <a:ea typeface="+mn-ea"/>
+                          <a:cs typeface="+mn-cs"/>
+                        </a:rPr>
+                        <a:t>Forest</a:t>
+                      </a:r>
+                      <a:r>
+                        <a:rPr lang="id-ID" sz="1800" kern="1200" dirty="0">
+                          <a:solidFill>
+                            <a:schemeClr val="dk1"/>
+                          </a:solidFill>
+                          <a:effectLst/>
+                          <a:latin typeface="+mn-lt"/>
+                          <a:ea typeface="+mn-ea"/>
+                          <a:cs typeface="+mn-cs"/>
+                        </a:rPr>
+                        <a:t> </a:t>
                       </a:r>
                       <a:endParaRPr lang="id-ID" sz="1800" kern="100" dirty="0">
                         <a:solidFill>
@@ -16077,6 +16716,36 @@
                         <a:buNone/>
                       </a:pPr>
                       <a:r>
+                        <a:rPr lang="id-ID" sz="1800" kern="1200" dirty="0">
+                          <a:solidFill>
+                            <a:schemeClr val="dk1"/>
+                          </a:solidFill>
+                          <a:effectLst/>
+                          <a:latin typeface="+mn-lt"/>
+                          <a:ea typeface="+mn-ea"/>
+                          <a:cs typeface="+mn-cs"/>
+                        </a:rPr>
+                        <a:t>Regresi Logistik</a:t>
+                      </a:r>
+                      <a:endParaRPr lang="id-ID" sz="1800" kern="100" dirty="0">
+                        <a:effectLst/>
+                      </a:endParaRPr>
+                    </a:p>
+                  </a:txBody>
+                  <a:tcPr marL="34301" marR="34301" marT="0" marB="0" anchor="ctr"/>
+                </a:tc>
+                <a:tc>
+                  <a:txBody>
+                    <a:bodyPr/>
+                    <a:lstStyle/>
+                    <a:p>
+                      <a:pPr algn="l">
+                        <a:lnSpc>
+                          <a:spcPct val="100000"/>
+                        </a:lnSpc>
+                        <a:buNone/>
+                      </a:pPr>
+                      <a:r>
                         <a:rPr lang="id-ID" sz="1600" kern="0" dirty="0">
                           <a:effectLst/>
                         </a:rPr>
@@ -16125,29 +16794,6 @@
                       </a:r>
                       <a:endParaRPr lang="id-ID" sz="1800" kern="100" dirty="0">
                         <a:effectLst/>
-                      </a:endParaRPr>
-                    </a:p>
-                    <a:p>
-                      <a:pPr algn="l">
-                        <a:lnSpc>
-                          <a:spcPct val="100000"/>
-                        </a:lnSpc>
-                        <a:buNone/>
-                      </a:pPr>
-                      <a:r>
-                        <a:rPr lang="id-ID" sz="1600" kern="0" dirty="0">
-                          <a:effectLst/>
-                        </a:rPr>
-                        <a:t>Hasil ini menunjukkan bahwa model linier yang lebih sederhana masih bisa mencapai performa yang kuat jika diperkaya dengan fitur-fitur yang relevan dan inovatif.</a:t>
-                      </a:r>
-                      <a:endParaRPr lang="id-ID" sz="1800" kern="100" dirty="0">
-                        <a:solidFill>
-                          <a:srgbClr val="000000"/>
-                        </a:solidFill>
-                        <a:effectLst/>
-                        <a:latin typeface="Times New Roman" panose="02020603050405020304" pitchFamily="18" charset="0"/>
-                        <a:ea typeface="Calibri" panose="020F0502020204030204" pitchFamily="34" charset="0"/>
-                        <a:cs typeface="Arial" panose="020B0604020202020204" pitchFamily="34" charset="0"/>
                       </a:endParaRPr>
                     </a:p>
                   </a:txBody>
@@ -16237,6 +16883,99 @@
                         </a:rPr>
                         <a:t> (2025)</a:t>
                       </a:r>
+                      <a:endParaRPr lang="id-ID" sz="1800" kern="100" dirty="0">
+                        <a:solidFill>
+                          <a:srgbClr val="000000"/>
+                        </a:solidFill>
+                        <a:effectLst/>
+                        <a:latin typeface="Times New Roman" panose="02020603050405020304" pitchFamily="18" charset="0"/>
+                        <a:ea typeface="Calibri" panose="020F0502020204030204" pitchFamily="34" charset="0"/>
+                        <a:cs typeface="Arial" panose="020B0604020202020204" pitchFamily="34" charset="0"/>
+                      </a:endParaRPr>
+                    </a:p>
+                  </a:txBody>
+                  <a:tcPr marL="34301" marR="34301" marT="0" marB="0" anchor="ctr"/>
+                </a:tc>
+                <a:tc>
+                  <a:txBody>
+                    <a:bodyPr/>
+                    <a:lstStyle/>
+                    <a:p>
+                      <a:pPr marL="285750" indent="-285750">
+                        <a:buFont typeface="Arial" panose="020B0604020202020204" pitchFamily="34" charset="0"/>
+                        <a:buChar char="•"/>
+                      </a:pPr>
+                      <a:r>
+                        <a:rPr lang="id-ID" sz="1800" kern="1200" dirty="0">
+                          <a:solidFill>
+                            <a:schemeClr val="dk1"/>
+                          </a:solidFill>
+                          <a:effectLst/>
+                          <a:latin typeface="+mn-lt"/>
+                          <a:ea typeface="+mn-ea"/>
+                          <a:cs typeface="+mn-cs"/>
+                        </a:rPr>
+                        <a:t>Jaringan Saraf </a:t>
+                      </a:r>
+                      <a:r>
+                        <a:rPr lang="id-ID" sz="1800" kern="1200" dirty="0" err="1">
+                          <a:solidFill>
+                            <a:schemeClr val="dk1"/>
+                          </a:solidFill>
+                          <a:effectLst/>
+                          <a:latin typeface="+mn-lt"/>
+                          <a:ea typeface="+mn-ea"/>
+                          <a:cs typeface="+mn-cs"/>
+                        </a:rPr>
+                        <a:t>Konvolusional</a:t>
+                      </a:r>
+                      <a:r>
+                        <a:rPr lang="id-ID" sz="1800" kern="1200" dirty="0">
+                          <a:solidFill>
+                            <a:schemeClr val="dk1"/>
+                          </a:solidFill>
+                          <a:effectLst/>
+                          <a:latin typeface="+mn-lt"/>
+                          <a:ea typeface="+mn-ea"/>
+                          <a:cs typeface="+mn-cs"/>
+                        </a:rPr>
+                        <a:t> (CNN)</a:t>
+                      </a:r>
+                      <a:endParaRPr lang="en-GB" sz="1800" kern="1200" dirty="0">
+                        <a:solidFill>
+                          <a:schemeClr val="dk1"/>
+                        </a:solidFill>
+                        <a:effectLst/>
+                        <a:latin typeface="+mn-lt"/>
+                        <a:ea typeface="+mn-ea"/>
+                        <a:cs typeface="+mn-cs"/>
+                      </a:endParaRPr>
+                    </a:p>
+                    <a:p>
+                      <a:pPr marL="285750" indent="-285750">
+                        <a:buFont typeface="Arial" panose="020B0604020202020204" pitchFamily="34" charset="0"/>
+                        <a:buChar char="•"/>
+                      </a:pPr>
+                      <a:r>
+                        <a:rPr lang="id-ID" sz="1800" kern="1200" dirty="0">
+                          <a:solidFill>
+                            <a:schemeClr val="dk1"/>
+                          </a:solidFill>
+                          <a:effectLst/>
+                          <a:latin typeface="+mn-lt"/>
+                          <a:ea typeface="+mn-ea"/>
+                          <a:cs typeface="+mn-cs"/>
+                        </a:rPr>
+                        <a:t>Regresi Logistik</a:t>
+                      </a:r>
+                    </a:p>
+                    <a:p>
+                      <a:pPr algn="l">
+                        <a:lnSpc>
+                          <a:spcPct val="100000"/>
+                        </a:lnSpc>
+                        <a:buNone/>
+                      </a:pPr>
                       <a:endParaRPr lang="id-ID" sz="1800" kern="100" dirty="0">
                         <a:solidFill>
                           <a:srgbClr val="000000"/>
@@ -16368,7 +17107,7 @@
 </p:sld>
 </file>
 
-<file path=ppt/slides/slide12.xml><?xml version="1.0" encoding="utf-8"?>
+<file path=ppt/slides/slide13.xml><?xml version="1.0" encoding="utf-8"?>
 <p:sld xmlns:a="http://schemas.openxmlformats.org/drawingml/2006/main" xmlns:r="http://schemas.openxmlformats.org/officeDocument/2006/relationships" xmlns:p="http://schemas.openxmlformats.org/presentationml/2006/main">
   <p:cSld>
     <p:spTree>
@@ -16446,7 +17185,7 @@
             <a:pPr rtl="0"/>
             <a:fld id="{A808DD98-197B-46F5-A6AA-BDA332D7E685}" type="datetime1">
               <a:rPr lang="id-ID" smtClean="0"/>
-              <a:t>18/07/2025</a:t>
+              <a:t>28/07/2025</a:t>
             </a:fld>
             <a:endParaRPr lang="id-ID"/>
           </a:p>
@@ -16506,7 +17245,7 @@
             <a:fld id="{294A09A9-5501-47C1-A89A-A340965A2BE2}" type="slidenum">
               <a:rPr lang="id-ID" smtClean="0"/>
               <a:pPr rtl="0"/>
-              <a:t>12</a:t>
+              <a:t>13</a:t>
             </a:fld>
             <a:endParaRPr lang="id-ID"/>
           </a:p>
@@ -16568,7 +17307,7 @@
 </p:sld>
 </file>
 
-<file path=ppt/slides/slide13.xml><?xml version="1.0" encoding="utf-8"?>
+<file path=ppt/slides/slide14.xml><?xml version="1.0" encoding="utf-8"?>
 <p:sld xmlns:a="http://schemas.openxmlformats.org/drawingml/2006/main" xmlns:r="http://schemas.openxmlformats.org/officeDocument/2006/relationships" xmlns:p="http://schemas.openxmlformats.org/presentationml/2006/main">
   <p:cSld>
     <p:spTree>
@@ -16760,7 +17499,7 @@
             <a:fld id="{294A09A9-5501-47C1-A89A-A340965A2BE2}" type="slidenum">
               <a:rPr lang="id-ID" smtClean="0"/>
               <a:pPr rtl="0"/>
-              <a:t>13</a:t>
+              <a:t>14</a:t>
             </a:fld>
             <a:endParaRPr lang="id-ID"/>
           </a:p>
@@ -16822,7 +17561,7 @@
 </p:sld>
 </file>
 
-<file path=ppt/slides/slide14.xml><?xml version="1.0" encoding="utf-8"?>
+<file path=ppt/slides/slide15.xml><?xml version="1.0" encoding="utf-8"?>
 <p:sld xmlns:a="http://schemas.openxmlformats.org/drawingml/2006/main" xmlns:r="http://schemas.openxmlformats.org/officeDocument/2006/relationships" xmlns:p="http://schemas.openxmlformats.org/presentationml/2006/main">
   <p:cSld>
     <p:spTree>
@@ -16903,7 +17642,7 @@
             <a:pPr rtl="0"/>
             <a:fld id="{294A09A9-5501-47C1-A89A-A340965A2BE2}" type="slidenum">
               <a:rPr lang="id-ID" smtClean="0"/>
-              <a:t>14</a:t>
+              <a:t>15</a:t>
             </a:fld>
             <a:endParaRPr lang="id-ID" dirty="0"/>
           </a:p>
@@ -17190,7 +17929,7 @@
 </p:sld>
 </file>
 
-<file path=ppt/slides/slide15.xml><?xml version="1.0" encoding="utf-8"?>
+<file path=ppt/slides/slide16.xml><?xml version="1.0" encoding="utf-8"?>
 <p:sld xmlns:a="http://schemas.openxmlformats.org/drawingml/2006/main" xmlns:r="http://schemas.openxmlformats.org/officeDocument/2006/relationships" xmlns:p="http://schemas.openxmlformats.org/presentationml/2006/main">
   <p:cSld>
     <p:spTree>
@@ -17292,8 +18031,8 @@
               <a:buChar char="•"/>
             </a:pPr>
             <a:r>
-              <a:rPr lang="id-ID" b="1" dirty="0"/>
-              <a:t>Analisis</a:t>
+              <a:rPr lang="en-GB" b="1" dirty="0" err="1"/>
+              <a:t>Interpretasi</a:t>
             </a:r>
             <a:r>
               <a:rPr lang="en-GB" b="1" dirty="0"/>
@@ -17311,8 +18050,12 @@
               <a:buChar char="•"/>
             </a:pPr>
             <a:r>
+              <a:rPr lang="en-GB" b="1" dirty="0" err="1"/>
+              <a:t>Interpretasi</a:t>
+            </a:r>
+            <a:r>
               <a:rPr lang="id-ID" b="1" dirty="0"/>
-              <a:t>Analisis Kinerja &amp; Tolok Ukur:</a:t>
+              <a:t>:</a:t>
             </a:r>
             <a:r>
               <a:rPr lang="id-ID" dirty="0"/>
@@ -17365,7 +18108,7 @@
             <a:fld id="{294A09A9-5501-47C1-A89A-A340965A2BE2}" type="slidenum">
               <a:rPr lang="id-ID" smtClean="0"/>
               <a:pPr rtl="0"/>
-              <a:t>15</a:t>
+              <a:t>16</a:t>
             </a:fld>
             <a:endParaRPr lang="id-ID"/>
           </a:p>
@@ -17427,7 +18170,7 @@
 </p:sld>
 </file>
 
-<file path=ppt/slides/slide16.xml><?xml version="1.0" encoding="utf-8"?>
+<file path=ppt/slides/slide17.xml><?xml version="1.0" encoding="utf-8"?>
 <p:sld xmlns:a="http://schemas.openxmlformats.org/drawingml/2006/main" xmlns:r="http://schemas.openxmlformats.org/officeDocument/2006/relationships" xmlns:p="http://schemas.openxmlformats.org/presentationml/2006/main">
   <p:cSld>
     <p:spTree>
@@ -17632,7 +18375,23 @@
             </a:r>
             <a:r>
               <a:rPr lang="id-ID" dirty="0"/>
-              <a:t> adalah skor yang mengukur kualitas sebuah peluang, dengan nilai dari 0 (tidak mungkin gol) hingga 1 (pasti gol). Skor ini dihitung dengan menganalisis ribuan data tembakan sejenis untuk menjawab pertanyaan: </a:t>
+              <a:t> adalah skor yang mengukur kualitas sebuah peluang, dengan nilai </a:t>
+            </a:r>
+            <a:r>
+              <a:rPr lang="id-ID" b="1" dirty="0"/>
+              <a:t>dari</a:t>
+            </a:r>
+            <a:r>
+              <a:rPr lang="id-ID" dirty="0"/>
+              <a:t> 0 (tidak mungkin gol) </a:t>
+            </a:r>
+            <a:r>
+              <a:rPr lang="id-ID" b="1" dirty="0"/>
+              <a:t>hingga</a:t>
+            </a:r>
+            <a:r>
+              <a:rPr lang="id-ID" dirty="0"/>
+              <a:t> 1 (pasti gol). Skor ini dihitung dengan menganalisis ribuan data tembakan sejenis untuk menjawab pertanyaan: </a:t>
             </a:r>
             <a:r>
               <a:rPr lang="id-ID" i="1" dirty="0"/>
@@ -18006,7 +18765,7 @@
             <a:pPr rtl="0"/>
             <a:fld id="{70C69C4D-CAFD-4E0E-94E0-4B1709D96441}" type="datetime1">
               <a:rPr lang="id-ID" smtClean="0"/>
-              <a:t>18/07/2025</a:t>
+              <a:t>28/07/2025</a:t>
             </a:fld>
             <a:endParaRPr lang="id-ID"/>
           </a:p>
@@ -19205,8 +19964,8 @@
         </p:nvSpPr>
         <p:spPr>
           <a:xfrm>
-            <a:off x="1167492" y="1706563"/>
-            <a:ext cx="9157607" cy="3650254"/>
+            <a:off x="1167492" y="2020529"/>
+            <a:ext cx="9157607" cy="3347884"/>
           </a:xfrm>
         </p:spPr>
         <p:txBody>
@@ -19220,101 +19979,16 @@
               <a:buChar char="•"/>
             </a:pPr>
             <a:r>
-              <a:rPr lang="id-ID" sz="2400" b="1" dirty="0"/>
-              <a:t>Keterbatasan Algoritma Lama</a:t>
-            </a:r>
-            <a:endParaRPr lang="id-ID" sz="2400" dirty="0"/>
-          </a:p>
-          <a:p>
-            <a:pPr marL="800100" lvl="1" indent="-342900">
-              <a:buFont typeface="Arial" panose="020B0604020202020204" pitchFamily="34" charset="0"/>
-              <a:buChar char="•"/>
-            </a:pPr>
-            <a:r>
-              <a:rPr lang="id-ID" sz="2000" dirty="0"/>
+              <a:rPr lang="id-ID" sz="3200" dirty="0"/>
               <a:t>Model yang umum digunakan (seperti Regresi Logistik) kesulitan menangkap </a:t>
             </a:r>
             <a:r>
-              <a:rPr lang="id-ID" sz="2000" b="1" dirty="0"/>
+              <a:rPr lang="id-ID" sz="3200" b="1" dirty="0"/>
               <a:t>pola data yang kompleks (non-linear)</a:t>
             </a:r>
             <a:r>
-              <a:rPr lang="id-ID" sz="2000" dirty="0"/>
+              <a:rPr lang="id-ID" sz="3200" dirty="0"/>
               <a:t> dalam sepak bola.</a:t>
-            </a:r>
-          </a:p>
-          <a:p>
-            <a:pPr marL="800100" lvl="1" indent="-342900">
-              <a:buFont typeface="Arial" panose="020B0604020202020204" pitchFamily="34" charset="0"/>
-              <a:buChar char="•"/>
-            </a:pPr>
-            <a:r>
-              <a:rPr lang="en-GB" sz="2000" dirty="0" err="1"/>
-              <a:t>Namun</a:t>
-            </a:r>
-            <a:r>
-              <a:rPr lang="en-GB" sz="2000" dirty="0"/>
-              <a:t>, a</a:t>
-            </a:r>
-            <a:r>
-              <a:rPr lang="id-ID" sz="2000" dirty="0" err="1"/>
-              <a:t>lgoritma</a:t>
-            </a:r>
-            <a:r>
-              <a:rPr lang="id-ID" sz="2000" dirty="0"/>
-              <a:t> yang lebih </a:t>
-            </a:r>
-            <a:r>
-              <a:rPr lang="en-GB" sz="2000" dirty="0" err="1"/>
-              <a:t>baik</a:t>
-            </a:r>
-            <a:r>
-              <a:rPr lang="en-GB" sz="2000" dirty="0"/>
-              <a:t> </a:t>
-            </a:r>
-            <a:r>
-              <a:rPr lang="en-GB" sz="2000" dirty="0" err="1"/>
-              <a:t>menangkap</a:t>
-            </a:r>
-            <a:r>
-              <a:rPr lang="en-GB" sz="2000" dirty="0"/>
-              <a:t> </a:t>
-            </a:r>
-            <a:r>
-              <a:rPr lang="en-GB" sz="2000" dirty="0" err="1"/>
-              <a:t>pola</a:t>
-            </a:r>
-            <a:r>
-              <a:rPr lang="en-GB" sz="2000" dirty="0"/>
-              <a:t> data non-linear</a:t>
-            </a:r>
-            <a:r>
-              <a:rPr lang="id-ID" sz="2000" dirty="0"/>
-              <a:t> </a:t>
-            </a:r>
-            <a:r>
-              <a:rPr lang="id-ID" sz="2000" dirty="0" err="1"/>
-              <a:t>seringkali</a:t>
-            </a:r>
-            <a:r>
-              <a:rPr lang="id-ID" sz="2000" dirty="0"/>
-              <a:t> </a:t>
-            </a:r>
-            <a:r>
-              <a:rPr lang="id-ID" sz="2000" b="1" dirty="0"/>
-              <a:t>tidak efisien</a:t>
-            </a:r>
-            <a:r>
-              <a:rPr lang="id-ID" sz="2000" dirty="0"/>
-              <a:t> dan </a:t>
-            </a:r>
-            <a:r>
-              <a:rPr lang="id-ID" sz="2000" b="1" dirty="0"/>
-              <a:t>lambat</a:t>
-            </a:r>
-            <a:r>
-              <a:rPr lang="id-ID" sz="2000" dirty="0"/>
-              <a:t> saat dihadapkan pada volume data yang besar.</a:t>
             </a:r>
           </a:p>
           <a:p>
@@ -19323,77 +19997,73 @@
               <a:buChar char="•"/>
             </a:pPr>
             <a:r>
-              <a:rPr lang="id-ID" sz="2400" b="1" dirty="0"/>
-              <a:t>Kebutuhan Model yang Optimal</a:t>
-            </a:r>
-            <a:endParaRPr lang="id-ID" sz="2400" dirty="0"/>
-          </a:p>
-          <a:p>
-            <a:pPr marL="800100" lvl="1" indent="-342900">
-              <a:buFont typeface="Arial" panose="020B0604020202020204" pitchFamily="34" charset="0"/>
-              <a:buChar char="•"/>
-            </a:pPr>
-            <a:r>
-              <a:rPr lang="id-ID" sz="2000" dirty="0"/>
-              <a:t>Dibutuhkan sebuah model yang mampu mengolah data </a:t>
-            </a:r>
-            <a:r>
-              <a:rPr lang="en-GB" sz="2000" dirty="0"/>
-              <a:t>non-linear </a:t>
-            </a:r>
-            <a:r>
-              <a:rPr lang="en-GB" sz="2000" dirty="0" err="1"/>
-              <a:t>sepak</a:t>
-            </a:r>
-            <a:r>
-              <a:rPr lang="en-GB" sz="2000" dirty="0"/>
-              <a:t> bola </a:t>
-            </a:r>
-            <a:r>
-              <a:rPr lang="id-ID" sz="2000" dirty="0"/>
-              <a:t>secara </a:t>
-            </a:r>
-            <a:r>
-              <a:rPr lang="id-ID" sz="2000" b="1" dirty="0"/>
-              <a:t>akurat</a:t>
-            </a:r>
-            <a:r>
-              <a:rPr lang="id-ID" sz="2000" dirty="0"/>
+              <a:rPr lang="en-GB" sz="3200" dirty="0" err="1"/>
+              <a:t>Namun</a:t>
+            </a:r>
+            <a:r>
+              <a:rPr lang="en-GB" sz="3200" dirty="0"/>
+              <a:t>, a</a:t>
+            </a:r>
+            <a:r>
+              <a:rPr lang="id-ID" sz="3200" dirty="0" err="1"/>
+              <a:t>lgoritma</a:t>
+            </a:r>
+            <a:r>
+              <a:rPr lang="id-ID" sz="3200" dirty="0"/>
+              <a:t> yang lebih </a:t>
+            </a:r>
+            <a:r>
+              <a:rPr lang="en-GB" sz="3200" dirty="0" err="1"/>
+              <a:t>baik</a:t>
+            </a:r>
+            <a:r>
+              <a:rPr lang="en-GB" sz="3200" dirty="0"/>
+              <a:t> </a:t>
+            </a:r>
+            <a:r>
+              <a:rPr lang="en-GB" sz="3200" dirty="0" err="1"/>
+              <a:t>menangkap</a:t>
+            </a:r>
+            <a:r>
+              <a:rPr lang="en-GB" sz="3200" dirty="0"/>
+              <a:t> </a:t>
+            </a:r>
+            <a:r>
+              <a:rPr lang="en-GB" sz="3200" dirty="0" err="1"/>
+              <a:t>pola</a:t>
+            </a:r>
+            <a:r>
+              <a:rPr lang="en-GB" sz="3200" dirty="0"/>
+              <a:t> data non-linear</a:t>
+            </a:r>
+            <a:r>
+              <a:rPr lang="id-ID" sz="3200" dirty="0"/>
+              <a:t> </a:t>
+            </a:r>
+            <a:r>
+              <a:rPr lang="id-ID" sz="3200" dirty="0" err="1"/>
+              <a:t>seringkali</a:t>
+            </a:r>
+            <a:r>
+              <a:rPr lang="id-ID" sz="3200" dirty="0"/>
+              <a:t> </a:t>
+            </a:r>
+            <a:r>
+              <a:rPr lang="id-ID" sz="3200" b="1" dirty="0"/>
+              <a:t>tidak efisien</a:t>
+            </a:r>
+            <a:r>
+              <a:rPr lang="id-ID" sz="3200" dirty="0"/>
               <a:t> dan </a:t>
             </a:r>
             <a:r>
-              <a:rPr lang="id-ID" sz="2000" b="1" dirty="0"/>
-              <a:t>cepat</a:t>
-            </a:r>
-            <a:r>
-              <a:rPr lang="id-ID" sz="2000" dirty="0"/>
-              <a:t>.</a:t>
-            </a:r>
-          </a:p>
-          <a:p>
-            <a:pPr marL="800100" lvl="1" indent="-342900">
-              <a:buFont typeface="Arial" panose="020B0604020202020204" pitchFamily="34" charset="0"/>
-              <a:buChar char="•"/>
-            </a:pPr>
-            <a:r>
-              <a:rPr lang="id-ID" sz="2000" dirty="0"/>
-              <a:t>Performa model ini harus dapat diukur secara komprehensif, tidak hanya dari akurasi, tetapi juga dari </a:t>
-            </a:r>
-            <a:r>
-              <a:rPr lang="id-ID" sz="2000" b="1" dirty="0"/>
-              <a:t>efisiensi waktu komputasi</a:t>
-            </a:r>
-            <a:r>
-              <a:rPr lang="id-ID" sz="2000" dirty="0"/>
-              <a:t>.</a:t>
-            </a:r>
-          </a:p>
-          <a:p>
-            <a:pPr marL="342900" indent="-342900" rtl="0">
-              <a:buFont typeface="Arial" panose="020B0604020202020204" pitchFamily="34" charset="0"/>
-              <a:buChar char="•"/>
-            </a:pPr>
-            <a:endParaRPr lang="id-ID" sz="2400" dirty="0"/>
+              <a:rPr lang="id-ID" sz="3200" b="1" dirty="0"/>
+              <a:t>lambat</a:t>
+            </a:r>
+            <a:r>
+              <a:rPr lang="id-ID" sz="3200" dirty="0"/>
+              <a:t> saat dihadapkan pada volume data yang besar.</a:t>
+            </a:r>
           </a:p>
         </p:txBody>
       </p:sp>
@@ -19587,7 +20257,7 @@
             </a:pPr>
             <a:r>
               <a:rPr lang="pt-BR" sz="4000" dirty="0"/>
-              <a:t>Seberapa efisien LightGBM dalam memproses data xG?</a:t>
+              <a:t>Seberapa efisien LightGBM dalam memproses data untuk prediksi xG?</a:t>
             </a:r>
             <a:endParaRPr lang="id-ID" sz="4000" dirty="0"/>
           </a:p>
@@ -19691,7 +20361,7 @@
             <a:pPr rtl="0"/>
             <a:fld id="{423EE75F-42B8-4E1A-83C6-1B72B3C0E408}" type="datetime1">
               <a:rPr lang="id-ID" smtClean="0"/>
-              <a:t>18/07/2025</a:t>
+              <a:t>28/07/2025</a:t>
             </a:fld>
             <a:endParaRPr lang="id-ID"/>
           </a:p>
@@ -20667,7 +21337,15 @@
           <a:p>
             <a:r>
               <a:rPr lang="en-GB" sz="4000" b="0" i="1" dirty="0"/>
-              <a:t>Expected Goals</a:t>
+              <a:t>Expected Goals (</a:t>
+            </a:r>
+            <a:r>
+              <a:rPr lang="en-GB" sz="4000" b="0" i="1" dirty="0" err="1"/>
+              <a:t>xG</a:t>
+            </a:r>
+            <a:r>
+              <a:rPr lang="en-GB" sz="4000" b="0" i="1" dirty="0"/>
+              <a:t>)</a:t>
             </a:r>
             <a:endParaRPr lang="id-ID" sz="4000" b="0" i="1" dirty="0"/>
           </a:p>
@@ -21519,6 +22197,15 @@
 </file>
 
 <file path=customXml/item1.xml><?xml version="1.0" encoding="utf-8"?>
+<?mso-contentType ?>
+<FormTemplates xmlns="http://schemas.microsoft.com/sharepoint/v3/contenttype/forms">
+  <Display>DocumentLibraryForm</Display>
+  <Edit>DocumentLibraryForm</Edit>
+  <New>DocumentLibraryForm</New>
+</FormTemplates>
+</file>
+
+<file path=customXml/item2.xml><?xml version="1.0" encoding="utf-8"?>
 <p:properties xmlns:p="http://schemas.microsoft.com/office/2006/metadata/properties" xmlns:xsi="http://www.w3.org/2001/XMLSchema-instance" xmlns:pc="http://schemas.microsoft.com/office/infopath/2007/PartnerControls">
   <documentManagement>
     <_ip_UnifiedCompliancePolicyUIAction xmlns="http://schemas.microsoft.com/sharepoint/v3" xsi:nil="true"/>
@@ -21535,15 +22222,6 @@
     <MediaServiceKeyPoints xmlns="71af3243-3dd4-4a8d-8c0d-dd76da1f02a5" xsi:nil="true"/>
   </documentManagement>
 </p:properties>
-</file>
-
-<file path=customXml/item2.xml><?xml version="1.0" encoding="utf-8"?>
-<?mso-contentType ?>
-<FormTemplates xmlns="http://schemas.microsoft.com/sharepoint/v3/contenttype/forms">
-  <Display>DocumentLibraryForm</Display>
-  <Edit>DocumentLibraryForm</Edit>
-  <New>DocumentLibraryForm</New>
-</FormTemplates>
 </file>
 
 <file path=customXml/item3.xml><?xml version="1.0" encoding="utf-8"?>
@@ -21829,6 +22507,14 @@
 </file>
 
 <file path=customXml/itemProps1.xml><?xml version="1.0" encoding="utf-8"?>
+<ds:datastoreItem xmlns:ds="http://schemas.openxmlformats.org/officeDocument/2006/customXml" ds:itemID="{85334180-0405-413B-834A-44FA9E05ADB7}">
+  <ds:schemaRefs>
+    <ds:schemaRef ds:uri="http://schemas.microsoft.com/sharepoint/v3/contenttype/forms"/>
+  </ds:schemaRefs>
+</ds:datastoreItem>
+</file>
+
+<file path=customXml/itemProps2.xml><?xml version="1.0" encoding="utf-8"?>
 <ds:datastoreItem xmlns:ds="http://schemas.openxmlformats.org/officeDocument/2006/customXml" ds:itemID="{4D5BAB77-79E1-4739-AA51-10C9079186D6}">
   <ds:schemaRefs>
     <ds:schemaRef ds:uri="http://schemas.microsoft.com/office/2006/metadata/properties"/>
@@ -21836,14 +22522,6 @@
     <ds:schemaRef ds:uri="http://schemas.microsoft.com/sharepoint/v3"/>
     <ds:schemaRef ds:uri="71af3243-3dd4-4a8d-8c0d-dd76da1f02a5"/>
     <ds:schemaRef ds:uri="230e9df3-be65-4c73-a93b-d1236ebd677e"/>
-  </ds:schemaRefs>
-</ds:datastoreItem>
-</file>
-
-<file path=customXml/itemProps2.xml><?xml version="1.0" encoding="utf-8"?>
-<ds:datastoreItem xmlns:ds="http://schemas.openxmlformats.org/officeDocument/2006/customXml" ds:itemID="{85334180-0405-413B-834A-44FA9E05ADB7}">
-  <ds:schemaRefs>
-    <ds:schemaRef ds:uri="http://schemas.microsoft.com/sharepoint/v3/contenttype/forms"/>
   </ds:schemaRefs>
 </ds:datastoreItem>
 </file>

</xml_diff>